<commit_message>
drafted the presentation layout
</commit_message>
<xml_diff>
--- a/Deadlock.pptx
+++ b/Deadlock.pptx
@@ -5,18 +5,34 @@
     <p:sldMasterId id="2147484209" r:id="rId1"/>
   </p:sldMasterIdLst>
   <p:notesMasterIdLst>
-    <p:notesMasterId r:id="rId11"/>
+    <p:notesMasterId r:id="rId27"/>
   </p:notesMasterIdLst>
   <p:sldIdLst>
     <p:sldId id="264" r:id="rId2"/>
-    <p:sldId id="257" r:id="rId3"/>
-    <p:sldId id="263" r:id="rId4"/>
-    <p:sldId id="258" r:id="rId5"/>
-    <p:sldId id="260" r:id="rId6"/>
-    <p:sldId id="261" r:id="rId7"/>
-    <p:sldId id="262" r:id="rId8"/>
-    <p:sldId id="265" r:id="rId9"/>
-    <p:sldId id="266" r:id="rId10"/>
+    <p:sldId id="267" r:id="rId3"/>
+    <p:sldId id="276" r:id="rId4"/>
+    <p:sldId id="277" r:id="rId5"/>
+    <p:sldId id="268" r:id="rId6"/>
+    <p:sldId id="269" r:id="rId7"/>
+    <p:sldId id="270" r:id="rId8"/>
+    <p:sldId id="271" r:id="rId9"/>
+    <p:sldId id="272" r:id="rId10"/>
+    <p:sldId id="273" r:id="rId11"/>
+    <p:sldId id="274" r:id="rId12"/>
+    <p:sldId id="275" r:id="rId13"/>
+    <p:sldId id="278" r:id="rId14"/>
+    <p:sldId id="279" r:id="rId15"/>
+    <p:sldId id="280" r:id="rId16"/>
+    <p:sldId id="281" r:id="rId17"/>
+    <p:sldId id="282" r:id="rId18"/>
+    <p:sldId id="257" r:id="rId19"/>
+    <p:sldId id="263" r:id="rId20"/>
+    <p:sldId id="258" r:id="rId21"/>
+    <p:sldId id="260" r:id="rId22"/>
+    <p:sldId id="261" r:id="rId23"/>
+    <p:sldId id="262" r:id="rId24"/>
+    <p:sldId id="265" r:id="rId25"/>
+    <p:sldId id="266" r:id="rId26"/>
   </p:sldIdLst>
   <p:sldSz cx="9144000" cy="6858000" type="screen4x3"/>
   <p:notesSz cx="6858000" cy="9144000"/>
@@ -200,7 +216,7 @@
           <a:p>
             <a:fld id="{90745C2E-29D5-3543-B1D8-F10ECF5511BF}" type="datetimeFigureOut">
               <a:rPr lang="en-US" smtClean="0"/>
-              <a:t>5/5/14</a:t>
+              <a:t>6/05/14</a:t>
             </a:fld>
             <a:endParaRPr lang="en-US"/>
           </a:p>
@@ -587,7 +603,7 @@
           <a:p>
             <a:fld id="{56BE3D67-E84A-6F4F-8E3B-3BC46E162796}" type="slidenum">
               <a:rPr lang="en-US" smtClean="0"/>
-              <a:t>2</a:t>
+              <a:t>18</a:t>
             </a:fld>
             <a:endParaRPr lang="en-US"/>
           </a:p>
@@ -728,7 +744,7 @@
           <a:p>
             <a:fld id="{56BE3D67-E84A-6F4F-8E3B-3BC46E162796}" type="slidenum">
               <a:rPr lang="en-US" smtClean="0"/>
-              <a:t>3</a:t>
+              <a:t>19</a:t>
             </a:fld>
             <a:endParaRPr lang="en-US"/>
           </a:p>
@@ -816,7 +832,7 @@
           <a:p>
             <a:fld id="{56BE3D67-E84A-6F4F-8E3B-3BC46E162796}" type="slidenum">
               <a:rPr lang="en-US" smtClean="0"/>
-              <a:t>4</a:t>
+              <a:t>20</a:t>
             </a:fld>
             <a:endParaRPr lang="en-US"/>
           </a:p>
@@ -913,7 +929,7 @@
           <a:p>
             <a:fld id="{56BE3D67-E84A-6F4F-8E3B-3BC46E162796}" type="slidenum">
               <a:rPr lang="en-US" smtClean="0"/>
-              <a:t>5</a:t>
+              <a:t>21</a:t>
             </a:fld>
             <a:endParaRPr lang="en-US"/>
           </a:p>
@@ -1015,7 +1031,7 @@
           <a:p>
             <a:fld id="{56BE3D67-E84A-6F4F-8E3B-3BC46E162796}" type="slidenum">
               <a:rPr lang="en-US" smtClean="0"/>
-              <a:t>6</a:t>
+              <a:t>22</a:t>
             </a:fld>
             <a:endParaRPr lang="en-US"/>
           </a:p>
@@ -1125,7 +1141,7 @@
           <a:p>
             <a:fld id="{56BE3D67-E84A-6F4F-8E3B-3BC46E162796}" type="slidenum">
               <a:rPr lang="en-US" smtClean="0"/>
-              <a:t>7</a:t>
+              <a:t>23</a:t>
             </a:fld>
             <a:endParaRPr lang="en-US"/>
           </a:p>
@@ -1232,7 +1248,7 @@
           <a:p>
             <a:fld id="{56BE3D67-E84A-6F4F-8E3B-3BC46E162796}" type="slidenum">
               <a:rPr lang="en-US" smtClean="0"/>
-              <a:t>8</a:t>
+              <a:t>24</a:t>
             </a:fld>
             <a:endParaRPr lang="en-US"/>
           </a:p>
@@ -1576,7 +1592,7 @@
             <a:fld id="{25AE17C7-B787-4E50-994D-5E804113A1E9}" type="datetime4">
               <a:rPr lang="en-US" smtClean="0"/>
               <a:pPr/>
-              <a:t>May 5, 2014</a:t>
+              <a:t>May 6, 2014</a:t>
             </a:fld>
             <a:endParaRPr lang="en-US" dirty="0"/>
           </a:p>
@@ -1743,7 +1759,7 @@
             <a:fld id="{AFDD7A28-FA93-4136-BDC1-BCCB2687E678}" type="datetimeFigureOut">
               <a:rPr lang="en-US" smtClean="0"/>
               <a:pPr/>
-              <a:t>5/5/14</a:t>
+              <a:t>6/05/14</a:t>
             </a:fld>
             <a:endParaRPr lang="en-US"/>
           </a:p>
@@ -1975,7 +1991,7 @@
             <a:fld id="{AFDD7A28-FA93-4136-BDC1-BCCB2687E678}" type="datetimeFigureOut">
               <a:rPr lang="en-US" smtClean="0"/>
               <a:pPr/>
-              <a:t>5/5/14</a:t>
+              <a:t>6/05/14</a:t>
             </a:fld>
             <a:endParaRPr lang="en-US" dirty="0"/>
           </a:p>
@@ -2175,7 +2191,7 @@
             <a:fld id="{8995D68B-21AC-438B-BECE-4F17DA129F19}" type="datetime4">
               <a:rPr lang="en-US" smtClean="0"/>
               <a:pPr/>
-              <a:t>May 5, 2014</a:t>
+              <a:t>May 6, 2014</a:t>
             </a:fld>
             <a:endParaRPr lang="en-US" dirty="0"/>
           </a:p>
@@ -2585,7 +2601,7 @@
             <a:fld id="{679F0FCF-2EA5-4FF5-AF14-1CA9C8854AAB}" type="datetime4">
               <a:rPr lang="en-US" smtClean="0"/>
               <a:pPr/>
-              <a:t>May 5, 2014</a:t>
+              <a:t>May 6, 2014</a:t>
             </a:fld>
             <a:endParaRPr lang="en-US" dirty="0"/>
           </a:p>
@@ -2791,7 +2807,7 @@
             <a:fld id="{F9E781C6-1634-4A56-B2BE-62150BE83935}" type="datetime4">
               <a:rPr lang="en-US" smtClean="0"/>
               <a:pPr/>
-              <a:t>May 5, 2014</a:t>
+              <a:t>May 6, 2014</a:t>
             </a:fld>
             <a:endParaRPr lang="en-US" dirty="0"/>
           </a:p>
@@ -3199,7 +3215,7 @@
             <a:fld id="{A9372AC2-3C75-4F5F-A929-48958086FE36}" type="datetime4">
               <a:rPr lang="en-US" smtClean="0"/>
               <a:pPr/>
-              <a:t>May 5, 2014</a:t>
+              <a:t>May 6, 2014</a:t>
             </a:fld>
             <a:endParaRPr lang="en-US" dirty="0"/>
           </a:p>
@@ -3337,7 +3353,7 @@
             <a:fld id="{17509CF4-4C1A-45DC-BADA-6EFF91CB9ABB}" type="datetime4">
               <a:rPr lang="en-US" smtClean="0"/>
               <a:pPr/>
-              <a:t>May 5, 2014</a:t>
+              <a:t>May 6, 2014</a:t>
             </a:fld>
             <a:endParaRPr lang="en-US" dirty="0"/>
           </a:p>
@@ -3429,7 +3445,7 @@
             <a:fld id="{C53951C0-B478-4858-ABC7-96406A1C0480}" type="datetime4">
               <a:rPr lang="en-US" smtClean="0"/>
               <a:pPr/>
-              <a:t>May 5, 2014</a:t>
+              <a:t>May 6, 2014</a:t>
             </a:fld>
             <a:endParaRPr lang="en-US" dirty="0"/>
           </a:p>
@@ -3685,7 +3701,7 @@
             <a:fld id="{B867641A-9D94-4BD6-862F-F651067079BC}" type="datetime4">
               <a:rPr lang="en-US" smtClean="0"/>
               <a:pPr/>
-              <a:t>May 5, 2014</a:t>
+              <a:t>May 6, 2014</a:t>
             </a:fld>
             <a:endParaRPr lang="en-US" dirty="0"/>
           </a:p>
@@ -3985,7 +4001,7 @@
             <a:fld id="{D74F0C02-0EF4-4745-9D82-E8D3F59464E3}" type="datetime4">
               <a:rPr lang="en-US" smtClean="0"/>
               <a:pPr/>
-              <a:t>May 5, 2014</a:t>
+              <a:t>May 6, 2014</a:t>
             </a:fld>
             <a:endParaRPr lang="en-US" dirty="0"/>
           </a:p>
@@ -4218,7 +4234,7 @@
             <a:fld id="{87367800-479D-41B0-B3F2-2DCE95BA1381}" type="datetime4">
               <a:rPr lang="en-US" smtClean="0"/>
               <a:pPr/>
-              <a:t>May 5, 2014</a:t>
+              <a:t>May 6, 2014</a:t>
             </a:fld>
             <a:endParaRPr lang="en-US" dirty="0"/>
           </a:p>
@@ -4783,7 +4799,608 @@
 </p:sld>
 </file>
 
-<file path=ppt/slides/slide2.xml><?xml version="1.0" encoding="utf-8"?>
+<file path=ppt/slides/slide10.xml><?xml version="1.0" encoding="utf-8"?>
+<p:sld xmlns:a="http://schemas.openxmlformats.org/drawingml/2006/main" xmlns:r="http://schemas.openxmlformats.org/officeDocument/2006/relationships" xmlns:p="http://schemas.openxmlformats.org/presentationml/2006/main">
+  <p:cSld>
+    <p:spTree>
+      <p:nvGrpSpPr>
+        <p:cNvPr id="1" name=""/>
+        <p:cNvGrpSpPr/>
+        <p:nvPr/>
+      </p:nvGrpSpPr>
+      <p:grpSpPr>
+        <a:xfrm>
+          <a:off x="0" y="0"/>
+          <a:ext cx="0" cy="0"/>
+          <a:chOff x="0" y="0"/>
+          <a:chExt cx="0" cy="0"/>
+        </a:xfrm>
+      </p:grpSpPr>
+      <p:sp>
+        <p:nvSpPr>
+          <p:cNvPr id="2" name="Content Placeholder 1"/>
+          <p:cNvSpPr>
+            <a:spLocks noGrp="1"/>
+          </p:cNvSpPr>
+          <p:nvPr>
+            <p:ph sz="quarter" idx="13"/>
+          </p:nvPr>
+        </p:nvSpPr>
+        <p:spPr/>
+        <p:txBody>
+          <a:bodyPr/>
+          <a:lstStyle/>
+          <a:p>
+            <a:endParaRPr lang="en-US"/>
+          </a:p>
+        </p:txBody>
+      </p:sp>
+      <p:sp>
+        <p:nvSpPr>
+          <p:cNvPr id="3" name="Title 2"/>
+          <p:cNvSpPr>
+            <a:spLocks noGrp="1"/>
+          </p:cNvSpPr>
+          <p:nvPr>
+            <p:ph type="title"/>
+          </p:nvPr>
+        </p:nvSpPr>
+        <p:spPr/>
+        <p:txBody>
+          <a:bodyPr/>
+          <a:lstStyle/>
+          <a:p>
+            <a:r>
+              <a:rPr lang="en-US" dirty="0" smtClean="0"/>
+              <a:t>Deadlock - theory</a:t>
+            </a:r>
+            <a:endParaRPr lang="en-US" dirty="0"/>
+          </a:p>
+        </p:txBody>
+      </p:sp>
+    </p:spTree>
+    <p:extLst>
+      <p:ext uri="{BB962C8B-B14F-4D97-AF65-F5344CB8AC3E}">
+        <p14:creationId xmlns:p14="http://schemas.microsoft.com/office/powerpoint/2010/main" val="603049632"/>
+      </p:ext>
+    </p:extLst>
+  </p:cSld>
+  <p:clrMapOvr>
+    <a:masterClrMapping/>
+  </p:clrMapOvr>
+</p:sld>
+</file>
+
+<file path=ppt/slides/slide11.xml><?xml version="1.0" encoding="utf-8"?>
+<p:sld xmlns:a="http://schemas.openxmlformats.org/drawingml/2006/main" xmlns:r="http://schemas.openxmlformats.org/officeDocument/2006/relationships" xmlns:p="http://schemas.openxmlformats.org/presentationml/2006/main">
+  <p:cSld>
+    <p:spTree>
+      <p:nvGrpSpPr>
+        <p:cNvPr id="1" name=""/>
+        <p:cNvGrpSpPr/>
+        <p:nvPr/>
+      </p:nvGrpSpPr>
+      <p:grpSpPr>
+        <a:xfrm>
+          <a:off x="0" y="0"/>
+          <a:ext cx="0" cy="0"/>
+          <a:chOff x="0" y="0"/>
+          <a:chExt cx="0" cy="0"/>
+        </a:xfrm>
+      </p:grpSpPr>
+      <p:sp>
+        <p:nvSpPr>
+          <p:cNvPr id="2" name="Content Placeholder 1"/>
+          <p:cNvSpPr>
+            <a:spLocks noGrp="1"/>
+          </p:cNvSpPr>
+          <p:nvPr>
+            <p:ph sz="quarter" idx="13"/>
+          </p:nvPr>
+        </p:nvSpPr>
+        <p:spPr/>
+        <p:txBody>
+          <a:bodyPr/>
+          <a:lstStyle/>
+          <a:p>
+            <a:r>
+              <a:rPr lang="en-US" dirty="0" smtClean="0"/>
+              <a:t>demo</a:t>
+            </a:r>
+            <a:endParaRPr lang="en-US" dirty="0"/>
+          </a:p>
+        </p:txBody>
+      </p:sp>
+      <p:sp>
+        <p:nvSpPr>
+          <p:cNvPr id="3" name="Title 2"/>
+          <p:cNvSpPr>
+            <a:spLocks noGrp="1"/>
+          </p:cNvSpPr>
+          <p:nvPr>
+            <p:ph type="title"/>
+          </p:nvPr>
+        </p:nvSpPr>
+        <p:spPr/>
+        <p:txBody>
+          <a:bodyPr/>
+          <a:lstStyle/>
+          <a:p>
+            <a:r>
+              <a:rPr lang="en-US" dirty="0" smtClean="0"/>
+              <a:t>Deadlock - analogy</a:t>
+            </a:r>
+            <a:endParaRPr lang="en-US" dirty="0"/>
+          </a:p>
+        </p:txBody>
+      </p:sp>
+    </p:spTree>
+    <p:extLst>
+      <p:ext uri="{BB962C8B-B14F-4D97-AF65-F5344CB8AC3E}">
+        <p14:creationId xmlns:p14="http://schemas.microsoft.com/office/powerpoint/2010/main" val="1336972337"/>
+      </p:ext>
+    </p:extLst>
+  </p:cSld>
+  <p:clrMapOvr>
+    <a:masterClrMapping/>
+  </p:clrMapOvr>
+</p:sld>
+</file>
+
+<file path=ppt/slides/slide12.xml><?xml version="1.0" encoding="utf-8"?>
+<p:sld xmlns:a="http://schemas.openxmlformats.org/drawingml/2006/main" xmlns:r="http://schemas.openxmlformats.org/officeDocument/2006/relationships" xmlns:p="http://schemas.openxmlformats.org/presentationml/2006/main">
+  <p:cSld>
+    <p:spTree>
+      <p:nvGrpSpPr>
+        <p:cNvPr id="1" name=""/>
+        <p:cNvGrpSpPr/>
+        <p:nvPr/>
+      </p:nvGrpSpPr>
+      <p:grpSpPr>
+        <a:xfrm>
+          <a:off x="0" y="0"/>
+          <a:ext cx="0" cy="0"/>
+          <a:chOff x="0" y="0"/>
+          <a:chExt cx="0" cy="0"/>
+        </a:xfrm>
+      </p:grpSpPr>
+      <p:sp>
+        <p:nvSpPr>
+          <p:cNvPr id="2" name="Content Placeholder 1"/>
+          <p:cNvSpPr>
+            <a:spLocks noGrp="1"/>
+          </p:cNvSpPr>
+          <p:nvPr>
+            <p:ph sz="quarter" idx="13"/>
+          </p:nvPr>
+        </p:nvSpPr>
+        <p:spPr/>
+        <p:txBody>
+          <a:bodyPr/>
+          <a:lstStyle/>
+          <a:p>
+            <a:pPr algn="l"/>
+            <a:r>
+              <a:rPr lang="en-US" dirty="0" smtClean="0"/>
+              <a:t>How we know what we built is useful?</a:t>
+            </a:r>
+            <a:endParaRPr lang="en-US" dirty="0"/>
+          </a:p>
+        </p:txBody>
+      </p:sp>
+      <p:sp>
+        <p:nvSpPr>
+          <p:cNvPr id="3" name="Title 2"/>
+          <p:cNvSpPr>
+            <a:spLocks noGrp="1"/>
+          </p:cNvSpPr>
+          <p:nvPr>
+            <p:ph type="title"/>
+          </p:nvPr>
+        </p:nvSpPr>
+        <p:spPr/>
+        <p:txBody>
+          <a:bodyPr/>
+          <a:lstStyle/>
+          <a:p>
+            <a:r>
+              <a:rPr lang="en-US" dirty="0" smtClean="0"/>
+              <a:t>evaluation</a:t>
+            </a:r>
+            <a:endParaRPr lang="en-US" dirty="0"/>
+          </a:p>
+        </p:txBody>
+      </p:sp>
+    </p:spTree>
+    <p:extLst>
+      <p:ext uri="{BB962C8B-B14F-4D97-AF65-F5344CB8AC3E}">
+        <p14:creationId xmlns:p14="http://schemas.microsoft.com/office/powerpoint/2010/main" val="3381501128"/>
+      </p:ext>
+    </p:extLst>
+  </p:cSld>
+  <p:clrMapOvr>
+    <a:masterClrMapping/>
+  </p:clrMapOvr>
+</p:sld>
+</file>
+
+<file path=ppt/slides/slide13.xml><?xml version="1.0" encoding="utf-8"?>
+<p:sld xmlns:a="http://schemas.openxmlformats.org/drawingml/2006/main" xmlns:r="http://schemas.openxmlformats.org/officeDocument/2006/relationships" xmlns:p="http://schemas.openxmlformats.org/presentationml/2006/main">
+  <p:cSld>
+    <p:spTree>
+      <p:nvGrpSpPr>
+        <p:cNvPr id="1" name=""/>
+        <p:cNvGrpSpPr/>
+        <p:nvPr/>
+      </p:nvGrpSpPr>
+      <p:grpSpPr>
+        <a:xfrm>
+          <a:off x="0" y="0"/>
+          <a:ext cx="0" cy="0"/>
+          <a:chOff x="0" y="0"/>
+          <a:chExt cx="0" cy="0"/>
+        </a:xfrm>
+      </p:grpSpPr>
+      <p:sp>
+        <p:nvSpPr>
+          <p:cNvPr id="2" name="Content Placeholder 1"/>
+          <p:cNvSpPr>
+            <a:spLocks noGrp="1"/>
+          </p:cNvSpPr>
+          <p:nvPr>
+            <p:ph sz="quarter" idx="13"/>
+          </p:nvPr>
+        </p:nvSpPr>
+        <p:spPr/>
+        <p:txBody>
+          <a:bodyPr/>
+          <a:lstStyle/>
+          <a:p>
+            <a:endParaRPr lang="en-US"/>
+          </a:p>
+        </p:txBody>
+      </p:sp>
+      <p:sp>
+        <p:nvSpPr>
+          <p:cNvPr id="3" name="Title 2"/>
+          <p:cNvSpPr>
+            <a:spLocks noGrp="1"/>
+          </p:cNvSpPr>
+          <p:nvPr>
+            <p:ph type="title"/>
+          </p:nvPr>
+        </p:nvSpPr>
+        <p:spPr/>
+        <p:txBody>
+          <a:bodyPr/>
+          <a:lstStyle/>
+          <a:p>
+            <a:r>
+              <a:rPr lang="en-US" dirty="0" smtClean="0"/>
+              <a:t>Evaluation results</a:t>
+            </a:r>
+            <a:endParaRPr lang="en-US" dirty="0"/>
+          </a:p>
+        </p:txBody>
+      </p:sp>
+    </p:spTree>
+    <p:extLst>
+      <p:ext uri="{BB962C8B-B14F-4D97-AF65-F5344CB8AC3E}">
+        <p14:creationId xmlns:p14="http://schemas.microsoft.com/office/powerpoint/2010/main" val="3120414084"/>
+      </p:ext>
+    </p:extLst>
+  </p:cSld>
+  <p:clrMapOvr>
+    <a:masterClrMapping/>
+  </p:clrMapOvr>
+</p:sld>
+</file>
+
+<file path=ppt/slides/slide14.xml><?xml version="1.0" encoding="utf-8"?>
+<p:sld xmlns:a="http://schemas.openxmlformats.org/drawingml/2006/main" xmlns:r="http://schemas.openxmlformats.org/officeDocument/2006/relationships" xmlns:p="http://schemas.openxmlformats.org/presentationml/2006/main">
+  <p:cSld>
+    <p:spTree>
+      <p:nvGrpSpPr>
+        <p:cNvPr id="1" name=""/>
+        <p:cNvGrpSpPr/>
+        <p:nvPr/>
+      </p:nvGrpSpPr>
+      <p:grpSpPr>
+        <a:xfrm>
+          <a:off x="0" y="0"/>
+          <a:ext cx="0" cy="0"/>
+          <a:chOff x="0" y="0"/>
+          <a:chExt cx="0" cy="0"/>
+        </a:xfrm>
+      </p:grpSpPr>
+      <p:sp>
+        <p:nvSpPr>
+          <p:cNvPr id="2" name="Content Placeholder 1"/>
+          <p:cNvSpPr>
+            <a:spLocks noGrp="1"/>
+          </p:cNvSpPr>
+          <p:nvPr>
+            <p:ph sz="quarter" idx="13"/>
+          </p:nvPr>
+        </p:nvSpPr>
+        <p:spPr/>
+        <p:txBody>
+          <a:bodyPr/>
+          <a:lstStyle/>
+          <a:p>
+            <a:pPr algn="l"/>
+            <a:r>
+              <a:rPr lang="en-US" dirty="0" smtClean="0"/>
+              <a:t>Cross browser</a:t>
+            </a:r>
+          </a:p>
+          <a:p>
+            <a:pPr algn="l"/>
+            <a:r>
+              <a:rPr lang="en-US" dirty="0" smtClean="0"/>
+              <a:t>Cross platforms</a:t>
+            </a:r>
+            <a:endParaRPr lang="en-US" dirty="0"/>
+          </a:p>
+        </p:txBody>
+      </p:sp>
+      <p:sp>
+        <p:nvSpPr>
+          <p:cNvPr id="3" name="Title 2"/>
+          <p:cNvSpPr>
+            <a:spLocks noGrp="1"/>
+          </p:cNvSpPr>
+          <p:nvPr>
+            <p:ph type="title"/>
+          </p:nvPr>
+        </p:nvSpPr>
+        <p:spPr/>
+        <p:txBody>
+          <a:bodyPr/>
+          <a:lstStyle/>
+          <a:p>
+            <a:r>
+              <a:rPr lang="en-US" dirty="0" smtClean="0"/>
+              <a:t>challenges</a:t>
+            </a:r>
+            <a:endParaRPr lang="en-US" dirty="0"/>
+          </a:p>
+        </p:txBody>
+      </p:sp>
+    </p:spTree>
+    <p:extLst>
+      <p:ext uri="{BB962C8B-B14F-4D97-AF65-F5344CB8AC3E}">
+        <p14:creationId xmlns:p14="http://schemas.microsoft.com/office/powerpoint/2010/main" val="3539899242"/>
+      </p:ext>
+    </p:extLst>
+  </p:cSld>
+  <p:clrMapOvr>
+    <a:masterClrMapping/>
+  </p:clrMapOvr>
+</p:sld>
+</file>
+
+<file path=ppt/slides/slide15.xml><?xml version="1.0" encoding="utf-8"?>
+<p:sld xmlns:a="http://schemas.openxmlformats.org/drawingml/2006/main" xmlns:r="http://schemas.openxmlformats.org/officeDocument/2006/relationships" xmlns:p="http://schemas.openxmlformats.org/presentationml/2006/main">
+  <p:cSld>
+    <p:spTree>
+      <p:nvGrpSpPr>
+        <p:cNvPr id="1" name=""/>
+        <p:cNvGrpSpPr/>
+        <p:nvPr/>
+      </p:nvGrpSpPr>
+      <p:grpSpPr>
+        <a:xfrm>
+          <a:off x="0" y="0"/>
+          <a:ext cx="0" cy="0"/>
+          <a:chOff x="0" y="0"/>
+          <a:chExt cx="0" cy="0"/>
+        </a:xfrm>
+      </p:grpSpPr>
+      <p:sp>
+        <p:nvSpPr>
+          <p:cNvPr id="2" name="Content Placeholder 1"/>
+          <p:cNvSpPr>
+            <a:spLocks noGrp="1"/>
+          </p:cNvSpPr>
+          <p:nvPr>
+            <p:ph sz="quarter" idx="13"/>
+          </p:nvPr>
+        </p:nvSpPr>
+        <p:spPr/>
+        <p:txBody>
+          <a:bodyPr/>
+          <a:lstStyle/>
+          <a:p>
+            <a:endParaRPr lang="en-US" dirty="0"/>
+          </a:p>
+        </p:txBody>
+      </p:sp>
+      <p:sp>
+        <p:nvSpPr>
+          <p:cNvPr id="3" name="Title 2"/>
+          <p:cNvSpPr>
+            <a:spLocks noGrp="1"/>
+          </p:cNvSpPr>
+          <p:nvPr>
+            <p:ph type="title"/>
+          </p:nvPr>
+        </p:nvSpPr>
+        <p:spPr/>
+        <p:txBody>
+          <a:bodyPr/>
+          <a:lstStyle/>
+          <a:p>
+            <a:r>
+              <a:rPr lang="en-US" dirty="0" smtClean="0"/>
+              <a:t>Future works</a:t>
+            </a:r>
+            <a:endParaRPr lang="en-US" dirty="0"/>
+          </a:p>
+        </p:txBody>
+      </p:sp>
+    </p:spTree>
+    <p:extLst>
+      <p:ext uri="{BB962C8B-B14F-4D97-AF65-F5344CB8AC3E}">
+        <p14:creationId xmlns:p14="http://schemas.microsoft.com/office/powerpoint/2010/main" val="1135954290"/>
+      </p:ext>
+    </p:extLst>
+  </p:cSld>
+  <p:clrMapOvr>
+    <a:masterClrMapping/>
+  </p:clrMapOvr>
+</p:sld>
+</file>
+
+<file path=ppt/slides/slide16.xml><?xml version="1.0" encoding="utf-8"?>
+<p:sld xmlns:a="http://schemas.openxmlformats.org/drawingml/2006/main" xmlns:r="http://schemas.openxmlformats.org/officeDocument/2006/relationships" xmlns:p="http://schemas.openxmlformats.org/presentationml/2006/main">
+  <p:cSld>
+    <p:spTree>
+      <p:nvGrpSpPr>
+        <p:cNvPr id="1" name=""/>
+        <p:cNvGrpSpPr/>
+        <p:nvPr/>
+      </p:nvGrpSpPr>
+      <p:grpSpPr>
+        <a:xfrm>
+          <a:off x="0" y="0"/>
+          <a:ext cx="0" cy="0"/>
+          <a:chOff x="0" y="0"/>
+          <a:chExt cx="0" cy="0"/>
+        </a:xfrm>
+      </p:grpSpPr>
+      <p:sp>
+        <p:nvSpPr>
+          <p:cNvPr id="2" name="Content Placeholder 1"/>
+          <p:cNvSpPr>
+            <a:spLocks noGrp="1"/>
+          </p:cNvSpPr>
+          <p:nvPr>
+            <p:ph sz="quarter" idx="13"/>
+          </p:nvPr>
+        </p:nvSpPr>
+        <p:spPr/>
+        <p:txBody>
+          <a:bodyPr/>
+          <a:lstStyle/>
+          <a:p>
+            <a:endParaRPr lang="en-US"/>
+          </a:p>
+        </p:txBody>
+      </p:sp>
+      <p:sp>
+        <p:nvSpPr>
+          <p:cNvPr id="3" name="Title 2"/>
+          <p:cNvSpPr>
+            <a:spLocks noGrp="1"/>
+          </p:cNvSpPr>
+          <p:nvPr>
+            <p:ph type="title"/>
+          </p:nvPr>
+        </p:nvSpPr>
+        <p:spPr/>
+        <p:txBody>
+          <a:bodyPr/>
+          <a:lstStyle/>
+          <a:p>
+            <a:r>
+              <a:rPr lang="en-US" dirty="0" smtClean="0"/>
+              <a:t>summary</a:t>
+            </a:r>
+            <a:endParaRPr lang="en-US" dirty="0"/>
+          </a:p>
+        </p:txBody>
+      </p:sp>
+    </p:spTree>
+    <p:extLst>
+      <p:ext uri="{BB962C8B-B14F-4D97-AF65-F5344CB8AC3E}">
+        <p14:creationId xmlns:p14="http://schemas.microsoft.com/office/powerpoint/2010/main" val="2173952335"/>
+      </p:ext>
+    </p:extLst>
+  </p:cSld>
+  <p:clrMapOvr>
+    <a:masterClrMapping/>
+  </p:clrMapOvr>
+</p:sld>
+</file>
+
+<file path=ppt/slides/slide17.xml><?xml version="1.0" encoding="utf-8"?>
+<p:sld xmlns:a="http://schemas.openxmlformats.org/drawingml/2006/main" xmlns:r="http://schemas.openxmlformats.org/officeDocument/2006/relationships" xmlns:p="http://schemas.openxmlformats.org/presentationml/2006/main">
+  <p:cSld>
+    <p:spTree>
+      <p:nvGrpSpPr>
+        <p:cNvPr id="1" name=""/>
+        <p:cNvGrpSpPr/>
+        <p:nvPr/>
+      </p:nvGrpSpPr>
+      <p:grpSpPr>
+        <a:xfrm>
+          <a:off x="0" y="0"/>
+          <a:ext cx="0" cy="0"/>
+          <a:chOff x="0" y="0"/>
+          <a:chExt cx="0" cy="0"/>
+        </a:xfrm>
+      </p:grpSpPr>
+      <p:sp>
+        <p:nvSpPr>
+          <p:cNvPr id="2" name="Content Placeholder 1"/>
+          <p:cNvSpPr>
+            <a:spLocks noGrp="1"/>
+          </p:cNvSpPr>
+          <p:nvPr>
+            <p:ph sz="quarter" idx="13"/>
+          </p:nvPr>
+        </p:nvSpPr>
+        <p:spPr/>
+        <p:txBody>
+          <a:bodyPr/>
+          <a:lstStyle/>
+          <a:p>
+            <a:r>
+              <a:rPr lang="en-US" dirty="0" smtClean="0"/>
+              <a:t>Any questions?</a:t>
+            </a:r>
+            <a:endParaRPr lang="en-US" dirty="0"/>
+          </a:p>
+        </p:txBody>
+      </p:sp>
+      <p:sp>
+        <p:nvSpPr>
+          <p:cNvPr id="3" name="Title 2"/>
+          <p:cNvSpPr>
+            <a:spLocks noGrp="1"/>
+          </p:cNvSpPr>
+          <p:nvPr>
+            <p:ph type="title"/>
+          </p:nvPr>
+        </p:nvSpPr>
+        <p:spPr/>
+        <p:txBody>
+          <a:bodyPr/>
+          <a:lstStyle/>
+          <a:p>
+            <a:r>
+              <a:rPr lang="en-US" dirty="0" smtClean="0"/>
+              <a:t>Thank you</a:t>
+            </a:r>
+            <a:endParaRPr lang="en-US" dirty="0"/>
+          </a:p>
+        </p:txBody>
+      </p:sp>
+    </p:spTree>
+    <p:extLst>
+      <p:ext uri="{BB962C8B-B14F-4D97-AF65-F5344CB8AC3E}">
+        <p14:creationId xmlns:p14="http://schemas.microsoft.com/office/powerpoint/2010/main" val="735493861"/>
+      </p:ext>
+    </p:extLst>
+  </p:cSld>
+  <p:clrMapOvr>
+    <a:masterClrMapping/>
+  </p:clrMapOvr>
+</p:sld>
+</file>
+
+<file path=ppt/slides/slide18.xml><?xml version="1.0" encoding="utf-8"?>
 <p:sld xmlns:a="http://schemas.openxmlformats.org/drawingml/2006/main" xmlns:r="http://schemas.openxmlformats.org/officeDocument/2006/relationships" xmlns:p="http://schemas.openxmlformats.org/presentationml/2006/main">
   <p:cSld>
     <p:spTree>
@@ -5639,7 +6256,7 @@
 </p:sld>
 </file>
 
-<file path=ppt/slides/slide3.xml><?xml version="1.0" encoding="utf-8"?>
+<file path=ppt/slides/slide19.xml><?xml version="1.0" encoding="utf-8"?>
 <p:sld xmlns:a="http://schemas.openxmlformats.org/drawingml/2006/main" xmlns:r="http://schemas.openxmlformats.org/officeDocument/2006/relationships" xmlns:p="http://schemas.openxmlformats.org/presentationml/2006/main">
   <p:cSld>
     <p:spTree>
@@ -6594,7 +7211,99 @@
 </p:sld>
 </file>
 
-<file path=ppt/slides/slide4.xml><?xml version="1.0" encoding="utf-8"?>
+<file path=ppt/slides/slide2.xml><?xml version="1.0" encoding="utf-8"?>
+<p:sld xmlns:a="http://schemas.openxmlformats.org/drawingml/2006/main" xmlns:r="http://schemas.openxmlformats.org/officeDocument/2006/relationships" xmlns:p="http://schemas.openxmlformats.org/presentationml/2006/main">
+  <p:cSld>
+    <p:spTree>
+      <p:nvGrpSpPr>
+        <p:cNvPr id="1" name=""/>
+        <p:cNvGrpSpPr/>
+        <p:nvPr/>
+      </p:nvGrpSpPr>
+      <p:grpSpPr>
+        <a:xfrm>
+          <a:off x="0" y="0"/>
+          <a:ext cx="0" cy="0"/>
+          <a:chOff x="0" y="0"/>
+          <a:chExt cx="0" cy="0"/>
+        </a:xfrm>
+      </p:grpSpPr>
+      <p:sp>
+        <p:nvSpPr>
+          <p:cNvPr id="2" name="Content Placeholder 1"/>
+          <p:cNvSpPr>
+            <a:spLocks noGrp="1"/>
+          </p:cNvSpPr>
+          <p:nvPr>
+            <p:ph sz="quarter" idx="13"/>
+          </p:nvPr>
+        </p:nvSpPr>
+        <p:spPr/>
+        <p:txBody>
+          <a:bodyPr/>
+          <a:lstStyle/>
+          <a:p>
+            <a:pPr algn="l"/>
+            <a:r>
+              <a:rPr lang="en-US" dirty="0" smtClean="0"/>
+              <a:t>Motivation: why are we doing this, why developers find it hard to learn</a:t>
+            </a:r>
+          </a:p>
+          <a:p>
+            <a:pPr algn="l"/>
+            <a:endParaRPr lang="en-US" dirty="0" smtClean="0"/>
+          </a:p>
+          <a:p>
+            <a:pPr algn="l"/>
+            <a:endParaRPr lang="en-US" dirty="0"/>
+          </a:p>
+          <a:p>
+            <a:pPr algn="l"/>
+            <a:r>
+              <a:rPr lang="en-US" dirty="0" smtClean="0"/>
+              <a:t>What we will present</a:t>
+            </a:r>
+            <a:endParaRPr lang="en-US" dirty="0"/>
+          </a:p>
+        </p:txBody>
+      </p:sp>
+      <p:sp>
+        <p:nvSpPr>
+          <p:cNvPr id="3" name="Title 2"/>
+          <p:cNvSpPr>
+            <a:spLocks noGrp="1"/>
+          </p:cNvSpPr>
+          <p:nvPr>
+            <p:ph type="title"/>
+          </p:nvPr>
+        </p:nvSpPr>
+        <p:spPr/>
+        <p:txBody>
+          <a:bodyPr/>
+          <a:lstStyle/>
+          <a:p>
+            <a:r>
+              <a:rPr lang="en-US" dirty="0" smtClean="0"/>
+              <a:t>Why there are pitfalls?</a:t>
+            </a:r>
+            <a:endParaRPr lang="en-US" dirty="0"/>
+          </a:p>
+        </p:txBody>
+      </p:sp>
+    </p:spTree>
+    <p:extLst>
+      <p:ext uri="{BB962C8B-B14F-4D97-AF65-F5344CB8AC3E}">
+        <p14:creationId xmlns:p14="http://schemas.microsoft.com/office/powerpoint/2010/main" val="2240268380"/>
+      </p:ext>
+    </p:extLst>
+  </p:cSld>
+  <p:clrMapOvr>
+    <a:masterClrMapping/>
+  </p:clrMapOvr>
+</p:sld>
+</file>
+
+<file path=ppt/slides/slide20.xml><?xml version="1.0" encoding="utf-8"?>
 <p:sld xmlns:a="http://schemas.openxmlformats.org/drawingml/2006/main" xmlns:r="http://schemas.openxmlformats.org/officeDocument/2006/relationships" xmlns:p="http://schemas.openxmlformats.org/presentationml/2006/main">
   <p:cSld>
     <p:spTree>
@@ -7877,7 +8586,7 @@
 </p:sld>
 </file>
 
-<file path=ppt/slides/slide5.xml><?xml version="1.0" encoding="utf-8"?>
+<file path=ppt/slides/slide21.xml><?xml version="1.0" encoding="utf-8"?>
 <p:sld xmlns:a="http://schemas.openxmlformats.org/drawingml/2006/main" xmlns:r="http://schemas.openxmlformats.org/officeDocument/2006/relationships" xmlns:p="http://schemas.openxmlformats.org/presentationml/2006/main">
   <p:cSld>
     <p:spTree>
@@ -8492,7 +9201,7 @@
 </p:sld>
 </file>
 
-<file path=ppt/slides/slide6.xml><?xml version="1.0" encoding="utf-8"?>
+<file path=ppt/slides/slide22.xml><?xml version="1.0" encoding="utf-8"?>
 <p:sld xmlns:a="http://schemas.openxmlformats.org/drawingml/2006/main" xmlns:r="http://schemas.openxmlformats.org/officeDocument/2006/relationships" xmlns:p="http://schemas.openxmlformats.org/presentationml/2006/main">
   <p:cSld>
     <p:spTree>
@@ -8847,7 +9556,7 @@
 </p:sld>
 </file>
 
-<file path=ppt/slides/slide7.xml><?xml version="1.0" encoding="utf-8"?>
+<file path=ppt/slides/slide23.xml><?xml version="1.0" encoding="utf-8"?>
 <p:sld xmlns:a="http://schemas.openxmlformats.org/drawingml/2006/main" xmlns:r="http://schemas.openxmlformats.org/officeDocument/2006/relationships" xmlns:p="http://schemas.openxmlformats.org/presentationml/2006/main">
   <p:cSld>
     <p:spTree>
@@ -9171,7 +9880,7 @@
 </p:sld>
 </file>
 
-<file path=ppt/slides/slide8.xml><?xml version="1.0" encoding="utf-8"?>
+<file path=ppt/slides/slide24.xml><?xml version="1.0" encoding="utf-8"?>
 <p:sld xmlns:a="http://schemas.openxmlformats.org/drawingml/2006/main" xmlns:r="http://schemas.openxmlformats.org/officeDocument/2006/relationships" xmlns:p="http://schemas.openxmlformats.org/presentationml/2006/main">
   <p:cSld>
     <p:spTree>
@@ -9762,6 +10471,582 @@
 </p:sld>
 </file>
 
+<file path=ppt/slides/slide25.xml><?xml version="1.0" encoding="utf-8"?>
+<p:sld xmlns:a="http://schemas.openxmlformats.org/drawingml/2006/main" xmlns:r="http://schemas.openxmlformats.org/officeDocument/2006/relationships" xmlns:p="http://schemas.openxmlformats.org/presentationml/2006/main">
+  <p:cSld>
+    <p:spTree>
+      <p:nvGrpSpPr>
+        <p:cNvPr id="1" name=""/>
+        <p:cNvGrpSpPr/>
+        <p:nvPr/>
+      </p:nvGrpSpPr>
+      <p:grpSpPr>
+        <a:xfrm>
+          <a:off x="0" y="0"/>
+          <a:ext cx="0" cy="0"/>
+          <a:chOff x="0" y="0"/>
+          <a:chExt cx="0" cy="0"/>
+        </a:xfrm>
+      </p:grpSpPr>
+      <p:sp>
+        <p:nvSpPr>
+          <p:cNvPr id="2" name="Title 1"/>
+          <p:cNvSpPr>
+            <a:spLocks noGrp="1"/>
+          </p:cNvSpPr>
+          <p:nvPr>
+            <p:ph type="title"/>
+          </p:nvPr>
+        </p:nvSpPr>
+        <p:spPr/>
+        <p:txBody>
+          <a:bodyPr>
+            <a:normAutofit/>
+          </a:bodyPr>
+          <a:lstStyle/>
+          <a:p>
+            <a:r>
+              <a:rPr lang="en-US" dirty="0"/>
+              <a:t>Thank </a:t>
+            </a:r>
+            <a:r>
+              <a:rPr lang="en-US" dirty="0" smtClean="0"/>
+              <a:t>you</a:t>
+            </a:r>
+            <a:br>
+              <a:rPr lang="en-US" dirty="0" smtClean="0"/>
+            </a:br>
+            <a:endParaRPr lang="en-US" dirty="0"/>
+          </a:p>
+        </p:txBody>
+      </p:sp>
+      <p:sp>
+        <p:nvSpPr>
+          <p:cNvPr id="3" name="Subtitle 2"/>
+          <p:cNvSpPr>
+            <a:spLocks noGrp="1"/>
+          </p:cNvSpPr>
+          <p:nvPr>
+            <p:ph type="subTitle" idx="1"/>
+          </p:nvPr>
+        </p:nvSpPr>
+        <p:spPr/>
+        <p:txBody>
+          <a:bodyPr/>
+          <a:lstStyle/>
+          <a:p>
+            <a:r>
+              <a:rPr lang="en-US" dirty="0"/>
+              <a:t>Questions?</a:t>
+            </a:r>
+          </a:p>
+        </p:txBody>
+      </p:sp>
+    </p:spTree>
+    <p:extLst>
+      <p:ext uri="{BB962C8B-B14F-4D97-AF65-F5344CB8AC3E}">
+        <p14:creationId xmlns:p14="http://schemas.microsoft.com/office/powerpoint/2010/main" val="3649923153"/>
+      </p:ext>
+    </p:extLst>
+  </p:cSld>
+  <p:clrMapOvr>
+    <a:masterClrMapping/>
+  </p:clrMapOvr>
+</p:sld>
+</file>
+
+<file path=ppt/slides/slide3.xml><?xml version="1.0" encoding="utf-8"?>
+<p:sld xmlns:a="http://schemas.openxmlformats.org/drawingml/2006/main" xmlns:r="http://schemas.openxmlformats.org/officeDocument/2006/relationships" xmlns:p="http://schemas.openxmlformats.org/presentationml/2006/main">
+  <p:cSld>
+    <p:spTree>
+      <p:nvGrpSpPr>
+        <p:cNvPr id="1" name=""/>
+        <p:cNvGrpSpPr/>
+        <p:nvPr/>
+      </p:nvGrpSpPr>
+      <p:grpSpPr>
+        <a:xfrm>
+          <a:off x="0" y="0"/>
+          <a:ext cx="0" cy="0"/>
+          <a:chOff x="0" y="0"/>
+          <a:chExt cx="0" cy="0"/>
+        </a:xfrm>
+      </p:grpSpPr>
+      <p:sp>
+        <p:nvSpPr>
+          <p:cNvPr id="2" name="Content Placeholder 1"/>
+          <p:cNvSpPr>
+            <a:spLocks noGrp="1"/>
+          </p:cNvSpPr>
+          <p:nvPr>
+            <p:ph sz="quarter" idx="13"/>
+          </p:nvPr>
+        </p:nvSpPr>
+        <p:spPr/>
+        <p:txBody>
+          <a:bodyPr/>
+          <a:lstStyle/>
+          <a:p>
+            <a:pPr algn="l"/>
+            <a:r>
+              <a:rPr lang="en-US" dirty="0" smtClean="0"/>
+              <a:t>How we are helping developers to overcome those pitfalls.</a:t>
+            </a:r>
+          </a:p>
+          <a:p>
+            <a:pPr algn="l"/>
+            <a:r>
+              <a:rPr lang="en-US" dirty="0"/>
+              <a:t>	</a:t>
+            </a:r>
+            <a:r>
+              <a:rPr lang="en-US" dirty="0" smtClean="0"/>
+              <a:t>+ create a web app that help them to see analogical of what is going on in the code.</a:t>
+            </a:r>
+          </a:p>
+          <a:p>
+            <a:pPr algn="l"/>
+            <a:endParaRPr lang="en-US" dirty="0"/>
+          </a:p>
+        </p:txBody>
+      </p:sp>
+      <p:sp>
+        <p:nvSpPr>
+          <p:cNvPr id="3" name="Title 2"/>
+          <p:cNvSpPr>
+            <a:spLocks noGrp="1"/>
+          </p:cNvSpPr>
+          <p:nvPr>
+            <p:ph type="title"/>
+          </p:nvPr>
+        </p:nvSpPr>
+        <p:spPr/>
+        <p:txBody>
+          <a:bodyPr/>
+          <a:lstStyle/>
+          <a:p>
+            <a:r>
+              <a:rPr lang="en-US" dirty="0" smtClean="0"/>
+              <a:t>our contribution</a:t>
+            </a:r>
+            <a:endParaRPr lang="en-US" dirty="0"/>
+          </a:p>
+        </p:txBody>
+      </p:sp>
+    </p:spTree>
+    <p:extLst>
+      <p:ext uri="{BB962C8B-B14F-4D97-AF65-F5344CB8AC3E}">
+        <p14:creationId xmlns:p14="http://schemas.microsoft.com/office/powerpoint/2010/main" val="2103177259"/>
+      </p:ext>
+    </p:extLst>
+  </p:cSld>
+  <p:clrMapOvr>
+    <a:masterClrMapping/>
+  </p:clrMapOvr>
+</p:sld>
+</file>
+
+<file path=ppt/slides/slide4.xml><?xml version="1.0" encoding="utf-8"?>
+<p:sld xmlns:a="http://schemas.openxmlformats.org/drawingml/2006/main" xmlns:r="http://schemas.openxmlformats.org/officeDocument/2006/relationships" xmlns:p="http://schemas.openxmlformats.org/presentationml/2006/main">
+  <p:cSld>
+    <p:spTree>
+      <p:nvGrpSpPr>
+        <p:cNvPr id="1" name=""/>
+        <p:cNvGrpSpPr/>
+        <p:nvPr/>
+      </p:nvGrpSpPr>
+      <p:grpSpPr>
+        <a:xfrm>
+          <a:off x="0" y="0"/>
+          <a:ext cx="0" cy="0"/>
+          <a:chOff x="0" y="0"/>
+          <a:chExt cx="0" cy="0"/>
+        </a:xfrm>
+      </p:grpSpPr>
+      <p:sp>
+        <p:nvSpPr>
+          <p:cNvPr id="2" name="Content Placeholder 1"/>
+          <p:cNvSpPr>
+            <a:spLocks noGrp="1"/>
+          </p:cNvSpPr>
+          <p:nvPr>
+            <p:ph sz="quarter" idx="13"/>
+          </p:nvPr>
+        </p:nvSpPr>
+        <p:spPr/>
+        <p:txBody>
+          <a:bodyPr/>
+          <a:lstStyle/>
+          <a:p>
+            <a:pPr algn="l"/>
+            <a:r>
+              <a:rPr lang="en-US" dirty="0" smtClean="0"/>
+              <a:t>Reason why we chose web app over android?</a:t>
+            </a:r>
+            <a:endParaRPr lang="en-US" dirty="0"/>
+          </a:p>
+        </p:txBody>
+      </p:sp>
+      <p:sp>
+        <p:nvSpPr>
+          <p:cNvPr id="3" name="Title 2"/>
+          <p:cNvSpPr>
+            <a:spLocks noGrp="1"/>
+          </p:cNvSpPr>
+          <p:nvPr>
+            <p:ph type="title"/>
+          </p:nvPr>
+        </p:nvSpPr>
+        <p:spPr/>
+        <p:txBody>
+          <a:bodyPr/>
+          <a:lstStyle/>
+          <a:p>
+            <a:r>
+              <a:rPr lang="en-US" dirty="0" smtClean="0"/>
+              <a:t>Why web app?</a:t>
+            </a:r>
+            <a:endParaRPr lang="en-US" dirty="0"/>
+          </a:p>
+        </p:txBody>
+      </p:sp>
+    </p:spTree>
+    <p:extLst>
+      <p:ext uri="{BB962C8B-B14F-4D97-AF65-F5344CB8AC3E}">
+        <p14:creationId xmlns:p14="http://schemas.microsoft.com/office/powerpoint/2010/main" val="3246815448"/>
+      </p:ext>
+    </p:extLst>
+  </p:cSld>
+  <p:clrMapOvr>
+    <a:masterClrMapping/>
+  </p:clrMapOvr>
+</p:sld>
+</file>
+
+<file path=ppt/slides/slide5.xml><?xml version="1.0" encoding="utf-8"?>
+<p:sld xmlns:a="http://schemas.openxmlformats.org/drawingml/2006/main" xmlns:r="http://schemas.openxmlformats.org/officeDocument/2006/relationships" xmlns:p="http://schemas.openxmlformats.org/presentationml/2006/main">
+  <p:cSld>
+    <p:spTree>
+      <p:nvGrpSpPr>
+        <p:cNvPr id="1" name=""/>
+        <p:cNvGrpSpPr/>
+        <p:nvPr/>
+      </p:nvGrpSpPr>
+      <p:grpSpPr>
+        <a:xfrm>
+          <a:off x="0" y="0"/>
+          <a:ext cx="0" cy="0"/>
+          <a:chOff x="0" y="0"/>
+          <a:chExt cx="0" cy="0"/>
+        </a:xfrm>
+      </p:grpSpPr>
+      <p:sp>
+        <p:nvSpPr>
+          <p:cNvPr id="2" name="Content Placeholder 1"/>
+          <p:cNvSpPr>
+            <a:spLocks noGrp="1"/>
+          </p:cNvSpPr>
+          <p:nvPr>
+            <p:ph sz="quarter" idx="13"/>
+          </p:nvPr>
+        </p:nvSpPr>
+        <p:spPr/>
+        <p:txBody>
+          <a:bodyPr/>
+          <a:lstStyle/>
+          <a:p>
+            <a:pPr algn="l"/>
+            <a:r>
+              <a:rPr lang="en-US" dirty="0" smtClean="0"/>
+              <a:t>What common pitfalls we chose to implement</a:t>
+            </a:r>
+          </a:p>
+          <a:p>
+            <a:pPr algn="l"/>
+            <a:endParaRPr lang="en-US" dirty="0"/>
+          </a:p>
+          <a:p>
+            <a:pPr algn="l"/>
+            <a:endParaRPr lang="en-US" dirty="0" smtClean="0"/>
+          </a:p>
+          <a:p>
+            <a:pPr algn="l"/>
+            <a:r>
+              <a:rPr lang="en-US" dirty="0" smtClean="0"/>
+              <a:t>Why?</a:t>
+            </a:r>
+            <a:endParaRPr lang="en-US" dirty="0"/>
+          </a:p>
+        </p:txBody>
+      </p:sp>
+      <p:sp>
+        <p:nvSpPr>
+          <p:cNvPr id="3" name="Title 2"/>
+          <p:cNvSpPr>
+            <a:spLocks noGrp="1"/>
+          </p:cNvSpPr>
+          <p:nvPr>
+            <p:ph type="title"/>
+          </p:nvPr>
+        </p:nvSpPr>
+        <p:spPr/>
+        <p:txBody>
+          <a:bodyPr/>
+          <a:lstStyle/>
+          <a:p>
+            <a:r>
+              <a:rPr lang="en-US" dirty="0" smtClean="0"/>
+              <a:t>Chosen Common pitfalls</a:t>
+            </a:r>
+            <a:endParaRPr lang="en-US" dirty="0"/>
+          </a:p>
+        </p:txBody>
+      </p:sp>
+    </p:spTree>
+    <p:extLst>
+      <p:ext uri="{BB962C8B-B14F-4D97-AF65-F5344CB8AC3E}">
+        <p14:creationId xmlns:p14="http://schemas.microsoft.com/office/powerpoint/2010/main" val="2111521006"/>
+      </p:ext>
+    </p:extLst>
+  </p:cSld>
+  <p:clrMapOvr>
+    <a:masterClrMapping/>
+  </p:clrMapOvr>
+</p:sld>
+</file>
+
+<file path=ppt/slides/slide6.xml><?xml version="1.0" encoding="utf-8"?>
+<p:sld xmlns:a="http://schemas.openxmlformats.org/drawingml/2006/main" xmlns:r="http://schemas.openxmlformats.org/officeDocument/2006/relationships" xmlns:p="http://schemas.openxmlformats.org/presentationml/2006/main">
+  <p:cSld>
+    <p:spTree>
+      <p:nvGrpSpPr>
+        <p:cNvPr id="1" name=""/>
+        <p:cNvGrpSpPr/>
+        <p:nvPr/>
+      </p:nvGrpSpPr>
+      <p:grpSpPr>
+        <a:xfrm>
+          <a:off x="0" y="0"/>
+          <a:ext cx="0" cy="0"/>
+          <a:chOff x="0" y="0"/>
+          <a:chExt cx="0" cy="0"/>
+        </a:xfrm>
+      </p:grpSpPr>
+      <p:sp>
+        <p:nvSpPr>
+          <p:cNvPr id="2" name="Content Placeholder 1"/>
+          <p:cNvSpPr>
+            <a:spLocks noGrp="1"/>
+          </p:cNvSpPr>
+          <p:nvPr>
+            <p:ph sz="quarter" idx="13"/>
+          </p:nvPr>
+        </p:nvSpPr>
+        <p:spPr/>
+        <p:txBody>
+          <a:bodyPr/>
+          <a:lstStyle/>
+          <a:p>
+            <a:pPr algn="l"/>
+            <a:r>
+              <a:rPr lang="en-US" dirty="0" smtClean="0"/>
+              <a:t>Theory: what is Race Condition</a:t>
+            </a:r>
+          </a:p>
+          <a:p>
+            <a:pPr algn="l"/>
+            <a:endParaRPr lang="en-US" dirty="0"/>
+          </a:p>
+          <a:p>
+            <a:pPr algn="l"/>
+            <a:endParaRPr lang="en-US" dirty="0" smtClean="0"/>
+          </a:p>
+        </p:txBody>
+      </p:sp>
+      <p:sp>
+        <p:nvSpPr>
+          <p:cNvPr id="3" name="Title 2"/>
+          <p:cNvSpPr>
+            <a:spLocks noGrp="1"/>
+          </p:cNvSpPr>
+          <p:nvPr>
+            <p:ph type="title"/>
+          </p:nvPr>
+        </p:nvSpPr>
+        <p:spPr/>
+        <p:txBody>
+          <a:bodyPr/>
+          <a:lstStyle/>
+          <a:p>
+            <a:r>
+              <a:rPr lang="en-US" dirty="0" smtClean="0"/>
+              <a:t>Race condition - Theory</a:t>
+            </a:r>
+            <a:endParaRPr lang="en-US" dirty="0"/>
+          </a:p>
+        </p:txBody>
+      </p:sp>
+    </p:spTree>
+    <p:extLst>
+      <p:ext uri="{BB962C8B-B14F-4D97-AF65-F5344CB8AC3E}">
+        <p14:creationId xmlns:p14="http://schemas.microsoft.com/office/powerpoint/2010/main" val="3967287217"/>
+      </p:ext>
+    </p:extLst>
+  </p:cSld>
+  <p:clrMapOvr>
+    <a:masterClrMapping/>
+  </p:clrMapOvr>
+</p:sld>
+</file>
+
+<file path=ppt/slides/slide7.xml><?xml version="1.0" encoding="utf-8"?>
+<p:sld xmlns:a="http://schemas.openxmlformats.org/drawingml/2006/main" xmlns:r="http://schemas.openxmlformats.org/officeDocument/2006/relationships" xmlns:p="http://schemas.openxmlformats.org/presentationml/2006/main">
+  <p:cSld>
+    <p:spTree>
+      <p:nvGrpSpPr>
+        <p:cNvPr id="1" name=""/>
+        <p:cNvGrpSpPr/>
+        <p:nvPr/>
+      </p:nvGrpSpPr>
+      <p:grpSpPr>
+        <a:xfrm>
+          <a:off x="0" y="0"/>
+          <a:ext cx="0" cy="0"/>
+          <a:chOff x="0" y="0"/>
+          <a:chExt cx="0" cy="0"/>
+        </a:xfrm>
+      </p:grpSpPr>
+      <p:sp>
+        <p:nvSpPr>
+          <p:cNvPr id="2" name="Content Placeholder 1"/>
+          <p:cNvSpPr>
+            <a:spLocks noGrp="1"/>
+          </p:cNvSpPr>
+          <p:nvPr>
+            <p:ph sz="quarter" idx="13"/>
+          </p:nvPr>
+        </p:nvSpPr>
+        <p:spPr/>
+        <p:txBody>
+          <a:bodyPr/>
+          <a:lstStyle/>
+          <a:p>
+            <a:r>
+              <a:rPr lang="en-US" dirty="0" smtClean="0"/>
+              <a:t>Demo</a:t>
+            </a:r>
+            <a:endParaRPr lang="en-US" dirty="0"/>
+          </a:p>
+        </p:txBody>
+      </p:sp>
+      <p:sp>
+        <p:nvSpPr>
+          <p:cNvPr id="3" name="Title 2"/>
+          <p:cNvSpPr>
+            <a:spLocks noGrp="1"/>
+          </p:cNvSpPr>
+          <p:nvPr>
+            <p:ph type="title"/>
+          </p:nvPr>
+        </p:nvSpPr>
+        <p:spPr/>
+        <p:txBody>
+          <a:bodyPr/>
+          <a:lstStyle/>
+          <a:p>
+            <a:r>
+              <a:rPr lang="en-US" dirty="0" smtClean="0"/>
+              <a:t>Race condition - analogy</a:t>
+            </a:r>
+            <a:endParaRPr lang="en-US" dirty="0"/>
+          </a:p>
+        </p:txBody>
+      </p:sp>
+    </p:spTree>
+    <p:extLst>
+      <p:ext uri="{BB962C8B-B14F-4D97-AF65-F5344CB8AC3E}">
+        <p14:creationId xmlns:p14="http://schemas.microsoft.com/office/powerpoint/2010/main" val="1829804375"/>
+      </p:ext>
+    </p:extLst>
+  </p:cSld>
+  <p:clrMapOvr>
+    <a:masterClrMapping/>
+  </p:clrMapOvr>
+</p:sld>
+</file>
+
+<file path=ppt/slides/slide8.xml><?xml version="1.0" encoding="utf-8"?>
+<p:sld xmlns:a="http://schemas.openxmlformats.org/drawingml/2006/main" xmlns:r="http://schemas.openxmlformats.org/officeDocument/2006/relationships" xmlns:p="http://schemas.openxmlformats.org/presentationml/2006/main">
+  <p:cSld>
+    <p:spTree>
+      <p:nvGrpSpPr>
+        <p:cNvPr id="1" name=""/>
+        <p:cNvGrpSpPr/>
+        <p:nvPr/>
+      </p:nvGrpSpPr>
+      <p:grpSpPr>
+        <a:xfrm>
+          <a:off x="0" y="0"/>
+          <a:ext cx="0" cy="0"/>
+          <a:chOff x="0" y="0"/>
+          <a:chExt cx="0" cy="0"/>
+        </a:xfrm>
+      </p:grpSpPr>
+      <p:sp>
+        <p:nvSpPr>
+          <p:cNvPr id="2" name="Content Placeholder 1"/>
+          <p:cNvSpPr>
+            <a:spLocks noGrp="1"/>
+          </p:cNvSpPr>
+          <p:nvPr>
+            <p:ph sz="quarter" idx="13"/>
+          </p:nvPr>
+        </p:nvSpPr>
+        <p:spPr/>
+        <p:txBody>
+          <a:bodyPr/>
+          <a:lstStyle/>
+          <a:p>
+            <a:endParaRPr lang="en-US"/>
+          </a:p>
+        </p:txBody>
+      </p:sp>
+      <p:sp>
+        <p:nvSpPr>
+          <p:cNvPr id="3" name="Title 2"/>
+          <p:cNvSpPr>
+            <a:spLocks noGrp="1"/>
+          </p:cNvSpPr>
+          <p:nvPr>
+            <p:ph type="title"/>
+          </p:nvPr>
+        </p:nvSpPr>
+        <p:spPr/>
+        <p:txBody>
+          <a:bodyPr/>
+          <a:lstStyle/>
+          <a:p>
+            <a:r>
+              <a:rPr lang="en-US" dirty="0" smtClean="0"/>
+              <a:t>Critical section - theory</a:t>
+            </a:r>
+            <a:endParaRPr lang="en-US" dirty="0"/>
+          </a:p>
+        </p:txBody>
+      </p:sp>
+    </p:spTree>
+    <p:extLst>
+      <p:ext uri="{BB962C8B-B14F-4D97-AF65-F5344CB8AC3E}">
+        <p14:creationId xmlns:p14="http://schemas.microsoft.com/office/powerpoint/2010/main" val="68787422"/>
+      </p:ext>
+    </p:extLst>
+  </p:cSld>
+  <p:clrMapOvr>
+    <a:masterClrMapping/>
+  </p:clrMapOvr>
+</p:sld>
+</file>
+
 <file path=ppt/slides/slide9.xml><?xml version="1.0" encoding="utf-8"?>
 <p:sld xmlns:a="http://schemas.openxmlformats.org/drawingml/2006/main" xmlns:r="http://schemas.openxmlformats.org/officeDocument/2006/relationships" xmlns:p="http://schemas.openxmlformats.org/presentationml/2006/main">
   <p:cSld>
@@ -9781,7 +11066,30 @@
       </p:grpSpPr>
       <p:sp>
         <p:nvSpPr>
-          <p:cNvPr id="2" name="Title 1"/>
+          <p:cNvPr id="2" name="Content Placeholder 1"/>
+          <p:cNvSpPr>
+            <a:spLocks noGrp="1"/>
+          </p:cNvSpPr>
+          <p:nvPr>
+            <p:ph sz="quarter" idx="13"/>
+          </p:nvPr>
+        </p:nvSpPr>
+        <p:spPr/>
+        <p:txBody>
+          <a:bodyPr/>
+          <a:lstStyle/>
+          <a:p>
+            <a:r>
+              <a:rPr lang="en-US" dirty="0" smtClean="0"/>
+              <a:t>Demo</a:t>
+            </a:r>
+            <a:endParaRPr lang="en-US" dirty="0"/>
+          </a:p>
+        </p:txBody>
+      </p:sp>
+      <p:sp>
+        <p:nvSpPr>
+          <p:cNvPr id="3" name="Title 2"/>
           <p:cNvSpPr>
             <a:spLocks noGrp="1"/>
           </p:cNvSpPr>
@@ -9791,52 +11099,21 @@
         </p:nvSpPr>
         <p:spPr/>
         <p:txBody>
-          <a:bodyPr>
-            <a:normAutofit/>
-          </a:bodyPr>
-          <a:lstStyle/>
-          <a:p>
-            <a:r>
-              <a:rPr lang="en-US" dirty="0"/>
-              <a:t>Thank </a:t>
-            </a:r>
+          <a:bodyPr/>
+          <a:lstStyle/>
+          <a:p>
             <a:r>
               <a:rPr lang="en-US" dirty="0" smtClean="0"/>
-              <a:t>you</a:t>
-            </a:r>
-            <a:br>
-              <a:rPr lang="en-US" dirty="0" smtClean="0"/>
-            </a:br>
-            <a:endParaRPr lang="en-US" dirty="0"/>
-          </a:p>
-        </p:txBody>
-      </p:sp>
-      <p:sp>
-        <p:nvSpPr>
-          <p:cNvPr id="3" name="Subtitle 2"/>
-          <p:cNvSpPr>
-            <a:spLocks noGrp="1"/>
-          </p:cNvSpPr>
-          <p:nvPr>
-            <p:ph type="subTitle" idx="1"/>
-          </p:nvPr>
-        </p:nvSpPr>
-        <p:spPr/>
-        <p:txBody>
-          <a:bodyPr/>
-          <a:lstStyle/>
-          <a:p>
-            <a:r>
-              <a:rPr lang="en-US" dirty="0"/>
-              <a:t>Questions?</a:t>
-            </a:r>
+              <a:t>Critical section - analogy</a:t>
+            </a:r>
+            <a:endParaRPr lang="en-US" dirty="0"/>
           </a:p>
         </p:txBody>
       </p:sp>
     </p:spTree>
     <p:extLst>
       <p:ext uri="{BB962C8B-B14F-4D97-AF65-F5344CB8AC3E}">
-        <p14:creationId xmlns:p14="http://schemas.microsoft.com/office/powerpoint/2010/main" val="3649923153"/>
+        <p14:creationId xmlns:p14="http://schemas.microsoft.com/office/powerpoint/2010/main" val="2141124345"/>
       </p:ext>
     </p:extLst>
   </p:cSld>

</xml_diff>